<commit_message>
updated the level 1, level 0, and additional tools
</commit_message>
<xml_diff>
--- a/Final Presentation Slides/CubeSat  C3  Board.pptx
+++ b/Final Presentation Slides/CubeSat  C3  Board.pptx
@@ -137,6 +137,11 @@
       </a:defRPr>
     </a:lvl9pPr>
   </p:defaultTextStyle>
+  <p:extLst>
+    <p:ext uri="{EFAFB233-063F-42B5-8137-9DF3F51BA10A}">
+      <p15:sldGuideLst xmlns:p15="http://schemas.microsoft.com/office/powerpoint/2012/main"/>
+    </p:ext>
+  </p:extLst>
 </p:presentation>
 </file>
 
@@ -8288,25 +8293,32 @@
           </a:p>
         </p:txBody>
       </p:sp>
-      <p:sp>
-        <p:nvSpPr>
-          <p:cNvPr id="3" name="Content Placeholder 2"/>
-          <p:cNvSpPr>
-            <a:spLocks noGrp="1"/>
-          </p:cNvSpPr>
+      <p:pic>
+        <p:nvPicPr>
+          <p:cNvPr id="4" name="Content Placeholder 3"/>
+          <p:cNvPicPr>
+            <a:picLocks noGrp="1" noChangeAspect="1"/>
+          </p:cNvPicPr>
           <p:nvPr>
             <p:ph idx="1"/>
           </p:nvPr>
-        </p:nvSpPr>
-        <p:spPr/>
-        <p:txBody>
-          <a:bodyPr/>
-          <a:lstStyle/>
-          <a:p>
-            <a:endParaRPr lang="en-US"/>
-          </a:p>
-        </p:txBody>
-      </p:sp>
+        </p:nvPicPr>
+        <p:blipFill>
+          <a:blip r:embed="rId3"/>
+          <a:stretch>
+            <a:fillRect/>
+          </a:stretch>
+        </p:blipFill>
+        <p:spPr>
+          <a:xfrm>
+            <a:off x="1722286" y="1731963"/>
+            <a:ext cx="5691490" cy="4059237"/>
+          </a:xfrm>
+          <a:prstGeom prst="rect">
+            <a:avLst/>
+          </a:prstGeom>
+        </p:spPr>
+      </p:pic>
     </p:spTree>
     <p:extLst>
       <p:ext uri="{BB962C8B-B14F-4D97-AF65-F5344CB8AC3E}">
@@ -8440,7 +8452,9 @@
         </p:nvSpPr>
         <p:spPr/>
         <p:txBody>
-          <a:bodyPr/>
+          <a:bodyPr>
+            <a:normAutofit fontScale="92500" lnSpcReduction="10000"/>
+          </a:bodyPr>
           <a:lstStyle/>
           <a:p>
             <a:r>
@@ -8485,9 +8499,46 @@
           </a:p>
           <a:p>
             <a:r>
-              <a:rPr lang="en-US" dirty="0"/>
+              <a:rPr lang="en-US" dirty="0" smtClean="0"/>
               <a:t>VNA</a:t>
             </a:r>
+          </a:p>
+          <a:p>
+            <a:r>
+              <a:rPr lang="en-US" dirty="0">
+                <a:effectLst/>
+              </a:rPr>
+              <a:t>B</a:t>
+            </a:r>
+            <a:r>
+              <a:rPr lang="en-US" dirty="0" smtClean="0">
+                <a:effectLst/>
+              </a:rPr>
+              <a:t>oard Router</a:t>
+            </a:r>
+          </a:p>
+          <a:p>
+            <a:r>
+              <a:rPr lang="en-US" dirty="0" smtClean="0">
+                <a:effectLst/>
+              </a:rPr>
+              <a:t>Reflow Oven</a:t>
+            </a:r>
+          </a:p>
+          <a:p>
+            <a:r>
+              <a:rPr lang="en-US" dirty="0">
+                <a:effectLst/>
+              </a:rPr>
+              <a:t>L</a:t>
+            </a:r>
+            <a:r>
+              <a:rPr lang="en-US" dirty="0" smtClean="0">
+                <a:effectLst/>
+              </a:rPr>
+              <a:t>aser Cutter</a:t>
+            </a:r>
+            <a:endParaRPr lang="en-US" dirty="0"/>
           </a:p>
           <a:p>
             <a:endParaRPr lang="en-US" dirty="0"/>
@@ -12364,25 +12415,49 @@
           </a:p>
         </p:txBody>
       </p:sp>
-      <p:sp>
-        <p:nvSpPr>
-          <p:cNvPr id="3" name="Content Placeholder 2"/>
-          <p:cNvSpPr>
-            <a:spLocks noGrp="1"/>
-          </p:cNvSpPr>
+      <p:pic>
+        <p:nvPicPr>
+          <p:cNvPr id="1026" name="Picture 2" descr="https://lh5.googleusercontent.com/-z5V1Inc4j6E/VmkdbX_-udI/AAAAAAAAAuQ/vZgCi7Qp6WU/w1428-h1074-no/2015-12-09.png"/>
+          <p:cNvPicPr>
+            <a:picLocks noGrp="1" noChangeAspect="1" noChangeArrowheads="1"/>
+          </p:cNvPicPr>
           <p:nvPr>
             <p:ph idx="1"/>
           </p:nvPr>
-        </p:nvSpPr>
-        <p:spPr/>
-        <p:txBody>
-          <a:bodyPr/>
-          <a:lstStyle/>
-          <a:p>
-            <a:endParaRPr lang="en-US"/>
-          </a:p>
-        </p:txBody>
-      </p:sp>
+        </p:nvPicPr>
+        <p:blipFill>
+          <a:blip r:embed="rId3">
+            <a:extLst>
+              <a:ext uri="{28A0092B-C50C-407E-A947-70E740481C1C}">
+                <a14:useLocalDpi xmlns:a14="http://schemas.microsoft.com/office/drawing/2010/main" val="0"/>
+              </a:ext>
+            </a:extLst>
+          </a:blip>
+          <a:srcRect/>
+          <a:stretch>
+            <a:fillRect/>
+          </a:stretch>
+        </p:blipFill>
+        <p:spPr bwMode="auto">
+          <a:xfrm>
+            <a:off x="1869433" y="1731963"/>
+            <a:ext cx="5397197" cy="4059237"/>
+          </a:xfrm>
+          <a:prstGeom prst="rect">
+            <a:avLst/>
+          </a:prstGeom>
+          <a:noFill/>
+          <a:extLst>
+            <a:ext uri="{909E8E84-426E-40DD-AFC4-6F175D3DCCD1}">
+              <a14:hiddenFill xmlns:a14="http://schemas.microsoft.com/office/drawing/2010/main">
+                <a:solidFill>
+                  <a:srgbClr val="FFFFFF"/>
+                </a:solidFill>
+              </a14:hiddenFill>
+            </a:ext>
+          </a:extLst>
+        </p:spPr>
+      </p:pic>
     </p:spTree>
   </p:cSld>
   <p:clrMapOvr>

</xml_diff>